<commit_message>
modified: 2. Installing Python
</commit_message>
<xml_diff>
--- a/2. Installing Python.pptx
+++ b/2. Installing Python.pptx
@@ -6,7 +6,10 @@
   </p:sldMasterIdLst>
   <p:sldIdLst>
     <p:sldId id="257" r:id="rId2"/>
-    <p:sldId id="256" r:id="rId3"/>
+    <p:sldId id="258" r:id="rId3"/>
+    <p:sldId id="256" r:id="rId4"/>
+    <p:sldId id="259" r:id="rId5"/>
+    <p:sldId id="260" r:id="rId6"/>
   </p:sldIdLst>
   <p:sldSz cx="12192000" cy="6858000"/>
   <p:notesSz cx="6858000" cy="9144000"/>
@@ -3461,10 +3464,220 @@
           <a:chExt cx="0" cy="0"/>
         </a:xfrm>
       </p:grpSpPr>
+      <p:pic>
+        <p:nvPicPr>
+          <p:cNvPr id="2" name="Picture 1">
+            <a:extLst>
+              <a:ext uri="{FF2B5EF4-FFF2-40B4-BE49-F238E27FC236}">
+                <a16:creationId xmlns:a16="http://schemas.microsoft.com/office/drawing/2014/main" id="{F12FDF2A-1020-4056-B73A-3BA3D3C23018}"/>
+              </a:ext>
+            </a:extLst>
+          </p:cNvPr>
+          <p:cNvPicPr>
+            <a:picLocks noChangeAspect="1"/>
+          </p:cNvPicPr>
+          <p:nvPr/>
+        </p:nvPicPr>
+        <p:blipFill>
+          <a:blip r:embed="rId2"/>
+          <a:stretch>
+            <a:fillRect/>
+          </a:stretch>
+        </p:blipFill>
+        <p:spPr>
+          <a:xfrm>
+            <a:off x="0" y="1673"/>
+            <a:ext cx="12192000" cy="6854653"/>
+          </a:xfrm>
+          <a:prstGeom prst="rect">
+            <a:avLst/>
+          </a:prstGeom>
+        </p:spPr>
+      </p:pic>
+    </p:spTree>
+    <p:extLst>
+      <p:ext uri="{BB962C8B-B14F-4D97-AF65-F5344CB8AC3E}">
+        <p14:creationId xmlns:p14="http://schemas.microsoft.com/office/powerpoint/2010/main" val="3018324835"/>
+      </p:ext>
+    </p:extLst>
+  </p:cSld>
+  <p:clrMapOvr>
+    <a:masterClrMapping/>
+  </p:clrMapOvr>
+</p:sld>
+</file>
+
+<file path=ppt/slides/slide3.xml><?xml version="1.0" encoding="utf-8"?>
+<p:sld xmlns:a="http://schemas.openxmlformats.org/drawingml/2006/main" xmlns:r="http://schemas.openxmlformats.org/officeDocument/2006/relationships" xmlns:p="http://schemas.openxmlformats.org/presentationml/2006/main">
+  <p:cSld>
+    <p:spTree>
+      <p:nvGrpSpPr>
+        <p:cNvPr id="1" name=""/>
+        <p:cNvGrpSpPr/>
+        <p:nvPr/>
+      </p:nvGrpSpPr>
+      <p:grpSpPr>
+        <a:xfrm>
+          <a:off x="0" y="0"/>
+          <a:ext cx="0" cy="0"/>
+          <a:chOff x="0" y="0"/>
+          <a:chExt cx="0" cy="0"/>
+        </a:xfrm>
+      </p:grpSpPr>
+      <p:pic>
+        <p:nvPicPr>
+          <p:cNvPr id="4" name="Picture 3">
+            <a:extLst>
+              <a:ext uri="{FF2B5EF4-FFF2-40B4-BE49-F238E27FC236}">
+                <a16:creationId xmlns:a16="http://schemas.microsoft.com/office/drawing/2014/main" id="{A111737B-A761-4906-94A5-4B062C878E56}"/>
+              </a:ext>
+            </a:extLst>
+          </p:cNvPr>
+          <p:cNvPicPr>
+            <a:picLocks noChangeAspect="1"/>
+          </p:cNvPicPr>
+          <p:nvPr/>
+        </p:nvPicPr>
+        <p:blipFill>
+          <a:blip r:embed="rId2"/>
+          <a:stretch>
+            <a:fillRect/>
+          </a:stretch>
+        </p:blipFill>
+        <p:spPr>
+          <a:xfrm>
+            <a:off x="0" y="1673"/>
+            <a:ext cx="12192000" cy="6854653"/>
+          </a:xfrm>
+          <a:prstGeom prst="rect">
+            <a:avLst/>
+          </a:prstGeom>
+        </p:spPr>
+      </p:pic>
     </p:spTree>
     <p:extLst>
       <p:ext uri="{BB962C8B-B14F-4D97-AF65-F5344CB8AC3E}">
         <p14:creationId xmlns:p14="http://schemas.microsoft.com/office/powerpoint/2010/main" val="4294765966"/>
+      </p:ext>
+    </p:extLst>
+  </p:cSld>
+  <p:clrMapOvr>
+    <a:masterClrMapping/>
+  </p:clrMapOvr>
+</p:sld>
+</file>
+
+<file path=ppt/slides/slide4.xml><?xml version="1.0" encoding="utf-8"?>
+<p:sld xmlns:a="http://schemas.openxmlformats.org/drawingml/2006/main" xmlns:r="http://schemas.openxmlformats.org/officeDocument/2006/relationships" xmlns:p="http://schemas.openxmlformats.org/presentationml/2006/main">
+  <p:cSld>
+    <p:spTree>
+      <p:nvGrpSpPr>
+        <p:cNvPr id="1" name=""/>
+        <p:cNvGrpSpPr/>
+        <p:nvPr/>
+      </p:nvGrpSpPr>
+      <p:grpSpPr>
+        <a:xfrm>
+          <a:off x="0" y="0"/>
+          <a:ext cx="0" cy="0"/>
+          <a:chOff x="0" y="0"/>
+          <a:chExt cx="0" cy="0"/>
+        </a:xfrm>
+      </p:grpSpPr>
+      <p:pic>
+        <p:nvPicPr>
+          <p:cNvPr id="2" name="Picture 1">
+            <a:extLst>
+              <a:ext uri="{FF2B5EF4-FFF2-40B4-BE49-F238E27FC236}">
+                <a16:creationId xmlns:a16="http://schemas.microsoft.com/office/drawing/2014/main" id="{CF0F106E-E8E2-4B83-8185-32AA094E295F}"/>
+              </a:ext>
+            </a:extLst>
+          </p:cNvPr>
+          <p:cNvPicPr>
+            <a:picLocks noChangeAspect="1"/>
+          </p:cNvPicPr>
+          <p:nvPr/>
+        </p:nvPicPr>
+        <p:blipFill>
+          <a:blip r:embed="rId2"/>
+          <a:stretch>
+            <a:fillRect/>
+          </a:stretch>
+        </p:blipFill>
+        <p:spPr>
+          <a:xfrm>
+            <a:off x="0" y="1673"/>
+            <a:ext cx="12192000" cy="6854653"/>
+          </a:xfrm>
+          <a:prstGeom prst="rect">
+            <a:avLst/>
+          </a:prstGeom>
+        </p:spPr>
+      </p:pic>
+    </p:spTree>
+    <p:extLst>
+      <p:ext uri="{BB962C8B-B14F-4D97-AF65-F5344CB8AC3E}">
+        <p14:creationId xmlns:p14="http://schemas.microsoft.com/office/powerpoint/2010/main" val="2591756658"/>
+      </p:ext>
+    </p:extLst>
+  </p:cSld>
+  <p:clrMapOvr>
+    <a:masterClrMapping/>
+  </p:clrMapOvr>
+</p:sld>
+</file>
+
+<file path=ppt/slides/slide5.xml><?xml version="1.0" encoding="utf-8"?>
+<p:sld xmlns:a="http://schemas.openxmlformats.org/drawingml/2006/main" xmlns:r="http://schemas.openxmlformats.org/officeDocument/2006/relationships" xmlns:p="http://schemas.openxmlformats.org/presentationml/2006/main">
+  <p:cSld>
+    <p:spTree>
+      <p:nvGrpSpPr>
+        <p:cNvPr id="1" name=""/>
+        <p:cNvGrpSpPr/>
+        <p:nvPr/>
+      </p:nvGrpSpPr>
+      <p:grpSpPr>
+        <a:xfrm>
+          <a:off x="0" y="0"/>
+          <a:ext cx="0" cy="0"/>
+          <a:chOff x="0" y="0"/>
+          <a:chExt cx="0" cy="0"/>
+        </a:xfrm>
+      </p:grpSpPr>
+      <p:pic>
+        <p:nvPicPr>
+          <p:cNvPr id="2" name="Picture 1">
+            <a:extLst>
+              <a:ext uri="{FF2B5EF4-FFF2-40B4-BE49-F238E27FC236}">
+                <a16:creationId xmlns:a16="http://schemas.microsoft.com/office/drawing/2014/main" id="{AD468C80-88C4-4AA8-87F1-240298A1183D}"/>
+              </a:ext>
+            </a:extLst>
+          </p:cNvPr>
+          <p:cNvPicPr>
+            <a:picLocks noChangeAspect="1"/>
+          </p:cNvPicPr>
+          <p:nvPr/>
+        </p:nvPicPr>
+        <p:blipFill>
+          <a:blip r:embed="rId2"/>
+          <a:stretch>
+            <a:fillRect/>
+          </a:stretch>
+        </p:blipFill>
+        <p:spPr>
+          <a:xfrm>
+            <a:off x="0" y="1673"/>
+            <a:ext cx="12192000" cy="6854653"/>
+          </a:xfrm>
+          <a:prstGeom prst="rect">
+            <a:avLst/>
+          </a:prstGeom>
+        </p:spPr>
+      </p:pic>
+    </p:spTree>
+    <p:extLst>
+      <p:ext uri="{BB962C8B-B14F-4D97-AF65-F5344CB8AC3E}">
+        <p14:creationId xmlns:p14="http://schemas.microsoft.com/office/powerpoint/2010/main" val="1331559403"/>
       </p:ext>
     </p:extLst>
   </p:cSld>

</xml_diff>